<commit_message>
Dash dbc & multiapp examples
</commit_message>
<xml_diff>
--- a/Dash Features.pptx
+++ b/Dash Features.pptx
@@ -14,9 +14,10 @@
     <p:sldId id="261" r:id="rId8"/>
     <p:sldId id="263" r:id="rId9"/>
     <p:sldId id="264" r:id="rId10"/>
-    <p:sldId id="265" r:id="rId11"/>
-    <p:sldId id="267" r:id="rId12"/>
-    <p:sldId id="268" r:id="rId13"/>
+    <p:sldId id="269" r:id="rId11"/>
+    <p:sldId id="265" r:id="rId12"/>
+    <p:sldId id="267" r:id="rId13"/>
+    <p:sldId id="268" r:id="rId14"/>
   </p:sldIdLst>
   <p:sldSz cx="12192000" cy="6858000"/>
   <p:notesSz cx="6858000" cy="9144000"/>
@@ -272,7 +273,7 @@
           <a:p>
             <a:fld id="{BB35A562-BE17-4BC1-84B9-F5B76653FD8E}" type="datetimeFigureOut">
               <a:rPr lang="en-GB" smtClean="0"/>
-              <a:t>24/01/2020</a:t>
+              <a:t>10/04/2020</a:t>
             </a:fld>
             <a:endParaRPr lang="en-GB"/>
           </a:p>
@@ -472,7 +473,7 @@
           <a:p>
             <a:fld id="{BB35A562-BE17-4BC1-84B9-F5B76653FD8E}" type="datetimeFigureOut">
               <a:rPr lang="en-GB" smtClean="0"/>
-              <a:t>24/01/2020</a:t>
+              <a:t>10/04/2020</a:t>
             </a:fld>
             <a:endParaRPr lang="en-GB"/>
           </a:p>
@@ -682,7 +683,7 @@
           <a:p>
             <a:fld id="{BB35A562-BE17-4BC1-84B9-F5B76653FD8E}" type="datetimeFigureOut">
               <a:rPr lang="en-GB" smtClean="0"/>
-              <a:t>24/01/2020</a:t>
+              <a:t>10/04/2020</a:t>
             </a:fld>
             <a:endParaRPr lang="en-GB"/>
           </a:p>
@@ -882,7 +883,7 @@
           <a:p>
             <a:fld id="{BB35A562-BE17-4BC1-84B9-F5B76653FD8E}" type="datetimeFigureOut">
               <a:rPr lang="en-GB" smtClean="0"/>
-              <a:t>24/01/2020</a:t>
+              <a:t>10/04/2020</a:t>
             </a:fld>
             <a:endParaRPr lang="en-GB"/>
           </a:p>
@@ -1158,7 +1159,7 @@
           <a:p>
             <a:fld id="{BB35A562-BE17-4BC1-84B9-F5B76653FD8E}" type="datetimeFigureOut">
               <a:rPr lang="en-GB" smtClean="0"/>
-              <a:t>24/01/2020</a:t>
+              <a:t>10/04/2020</a:t>
             </a:fld>
             <a:endParaRPr lang="en-GB"/>
           </a:p>
@@ -1426,7 +1427,7 @@
           <a:p>
             <a:fld id="{BB35A562-BE17-4BC1-84B9-F5B76653FD8E}" type="datetimeFigureOut">
               <a:rPr lang="en-GB" smtClean="0"/>
-              <a:t>24/01/2020</a:t>
+              <a:t>10/04/2020</a:t>
             </a:fld>
             <a:endParaRPr lang="en-GB"/>
           </a:p>
@@ -1841,7 +1842,7 @@
           <a:p>
             <a:fld id="{BB35A562-BE17-4BC1-84B9-F5B76653FD8E}" type="datetimeFigureOut">
               <a:rPr lang="en-GB" smtClean="0"/>
-              <a:t>24/01/2020</a:t>
+              <a:t>10/04/2020</a:t>
             </a:fld>
             <a:endParaRPr lang="en-GB"/>
           </a:p>
@@ -1983,7 +1984,7 @@
           <a:p>
             <a:fld id="{BB35A562-BE17-4BC1-84B9-F5B76653FD8E}" type="datetimeFigureOut">
               <a:rPr lang="en-GB" smtClean="0"/>
-              <a:t>24/01/2020</a:t>
+              <a:t>10/04/2020</a:t>
             </a:fld>
             <a:endParaRPr lang="en-GB"/>
           </a:p>
@@ -2096,7 +2097,7 @@
           <a:p>
             <a:fld id="{BB35A562-BE17-4BC1-84B9-F5B76653FD8E}" type="datetimeFigureOut">
               <a:rPr lang="en-GB" smtClean="0"/>
-              <a:t>24/01/2020</a:t>
+              <a:t>10/04/2020</a:t>
             </a:fld>
             <a:endParaRPr lang="en-GB"/>
           </a:p>
@@ -2409,7 +2410,7 @@
           <a:p>
             <a:fld id="{BB35A562-BE17-4BC1-84B9-F5B76653FD8E}" type="datetimeFigureOut">
               <a:rPr lang="en-GB" smtClean="0"/>
-              <a:t>24/01/2020</a:t>
+              <a:t>10/04/2020</a:t>
             </a:fld>
             <a:endParaRPr lang="en-GB"/>
           </a:p>
@@ -2698,7 +2699,7 @@
           <a:p>
             <a:fld id="{BB35A562-BE17-4BC1-84B9-F5B76653FD8E}" type="datetimeFigureOut">
               <a:rPr lang="en-GB" smtClean="0"/>
-              <a:t>24/01/2020</a:t>
+              <a:t>10/04/2020</a:t>
             </a:fld>
             <a:endParaRPr lang="en-GB"/>
           </a:p>
@@ -2941,7 +2942,7 @@
           <a:p>
             <a:fld id="{BB35A562-BE17-4BC1-84B9-F5B76653FD8E}" type="datetimeFigureOut">
               <a:rPr lang="en-GB" smtClean="0"/>
-              <a:t>24/01/2020</a:t>
+              <a:t>10/04/2020</a:t>
             </a:fld>
             <a:endParaRPr lang="en-GB"/>
           </a:p>
@@ -3413,12 +3414,12 @@
         <p:spPr>
           <a:xfrm>
             <a:off x="1356049" y="3429000"/>
-            <a:ext cx="9144000" cy="1655762"/>
+            <a:ext cx="9144000" cy="2822510"/>
           </a:xfrm>
         </p:spPr>
         <p:txBody>
-          <a:bodyPr>
-            <a:normAutofit lnSpcReduction="10000"/>
+          <a:bodyPr numCol="3">
+            <a:normAutofit/>
           </a:bodyPr>
           <a:lstStyle/>
           <a:p>
@@ -3480,6 +3481,59 @@
               </a:rPr>
               <a:t> Notebooks</a:t>
             </a:r>
+            <a:endParaRPr lang="en-GB" dirty="0"/>
+          </a:p>
+          <a:p>
+            <a:pPr marL="342900" indent="-342900">
+              <a:buFontTx/>
+              <a:buChar char="-"/>
+            </a:pPr>
+            <a:r>
+              <a:rPr lang="en-GB" dirty="0">
+                <a:hlinkClick r:id="rId7"/>
+              </a:rPr>
+              <a:t>Style Sheets</a:t>
+            </a:r>
+            <a:endParaRPr lang="en-GB" dirty="0"/>
+          </a:p>
+          <a:p>
+            <a:pPr marL="342900" indent="-342900">
+              <a:buFontTx/>
+              <a:buChar char="-"/>
+            </a:pPr>
+            <a:r>
+              <a:rPr lang="en-GB" dirty="0">
+                <a:hlinkClick r:id="rId8"/>
+              </a:rPr>
+              <a:t>Scientific charts</a:t>
+            </a:r>
+            <a:endParaRPr lang="en-GB" dirty="0"/>
+          </a:p>
+          <a:p>
+            <a:pPr marL="342900" indent="-342900">
+              <a:buFontTx/>
+              <a:buChar char="-"/>
+            </a:pPr>
+            <a:r>
+              <a:rPr lang="en-GB" dirty="0">
+                <a:hlinkClick r:id="rId9"/>
+              </a:rPr>
+              <a:t>Ideas/Inspiration</a:t>
+            </a:r>
+            <a:endParaRPr lang="en-GB" dirty="0"/>
+          </a:p>
+          <a:p>
+            <a:pPr marL="342900" indent="-342900">
+              <a:buFontTx/>
+              <a:buChar char="-"/>
+            </a:pPr>
+            <a:endParaRPr lang="en-GB" dirty="0"/>
+          </a:p>
+          <a:p>
+            <a:pPr marL="342900" indent="-342900">
+              <a:buFontTx/>
+              <a:buChar char="-"/>
+            </a:pPr>
             <a:endParaRPr lang="en-GB" dirty="0"/>
           </a:p>
         </p:txBody>
@@ -3498,6 +3552,122 @@
 </file>
 
 <file path=ppt/slides/slide10.xml><?xml version="1.0" encoding="utf-8"?>
+<p:sld xmlns:a="http://schemas.openxmlformats.org/drawingml/2006/main" xmlns:r="http://schemas.openxmlformats.org/officeDocument/2006/relationships" xmlns:p="http://schemas.openxmlformats.org/presentationml/2006/main">
+  <p:cSld>
+    <p:spTree>
+      <p:nvGrpSpPr>
+        <p:cNvPr id="1" name=""/>
+        <p:cNvGrpSpPr/>
+        <p:nvPr/>
+      </p:nvGrpSpPr>
+      <p:grpSpPr>
+        <a:xfrm>
+          <a:off x="0" y="0"/>
+          <a:ext cx="0" cy="0"/>
+          <a:chOff x="0" y="0"/>
+          <a:chExt cx="0" cy="0"/>
+        </a:xfrm>
+      </p:grpSpPr>
+      <p:sp>
+        <p:nvSpPr>
+          <p:cNvPr id="2" name="Title 1">
+            <a:extLst>
+              <a:ext uri="{FF2B5EF4-FFF2-40B4-BE49-F238E27FC236}">
+                <a16:creationId xmlns:a16="http://schemas.microsoft.com/office/drawing/2014/main" id="{59A39706-FB40-4A5D-80DA-EBA17FD78E7C}"/>
+              </a:ext>
+            </a:extLst>
+          </p:cNvPr>
+          <p:cNvSpPr>
+            <a:spLocks noGrp="1"/>
+          </p:cNvSpPr>
+          <p:nvPr>
+            <p:ph type="title"/>
+          </p:nvPr>
+        </p:nvSpPr>
+        <p:spPr/>
+        <p:txBody>
+          <a:bodyPr>
+            <a:normAutofit fontScale="90000"/>
+          </a:bodyPr>
+          <a:lstStyle/>
+          <a:p>
+            <a:r>
+              <a:rPr lang="en-GB" dirty="0"/>
+              <a:t>Radar Charts</a:t>
+            </a:r>
+            <a:br>
+              <a:rPr lang="en-GB" dirty="0"/>
+            </a:br>
+            <a:r>
+              <a:rPr lang="en-GB" u="sng" dirty="0" err="1">
+                <a:hlinkClick r:id="rId2"/>
+              </a:rPr>
+              <a:t>radarChart</a:t>
+            </a:r>
+            <a:r>
+              <a:rPr lang="en-GB" dirty="0"/>
+              <a:t> </a:t>
+            </a:r>
+            <a:br>
+              <a:rPr lang="en-GB" dirty="0"/>
+            </a:br>
+            <a:r>
+              <a:rPr lang="en-GB" dirty="0">
+                <a:hlinkClick r:id="rId3"/>
+              </a:rPr>
+              <a:t>https://plotly.com/python/v3/polar-chart/2</a:t>
+            </a:r>
+            <a:br>
+              <a:rPr lang="en-GB" dirty="0"/>
+            </a:br>
+            <a:endParaRPr lang="en-GB" dirty="0"/>
+          </a:p>
+        </p:txBody>
+      </p:sp>
+      <p:pic>
+        <p:nvPicPr>
+          <p:cNvPr id="3" name="Picture 2">
+            <a:extLst>
+              <a:ext uri="{FF2B5EF4-FFF2-40B4-BE49-F238E27FC236}">
+                <a16:creationId xmlns:a16="http://schemas.microsoft.com/office/drawing/2014/main" id="{13893570-106A-41D7-BB29-807D8ACF7EB3}"/>
+              </a:ext>
+            </a:extLst>
+          </p:cNvPr>
+          <p:cNvPicPr>
+            <a:picLocks noChangeAspect="1"/>
+          </p:cNvPicPr>
+          <p:nvPr/>
+        </p:nvPicPr>
+        <p:blipFill>
+          <a:blip r:embed="rId4"/>
+          <a:stretch>
+            <a:fillRect/>
+          </a:stretch>
+        </p:blipFill>
+        <p:spPr>
+          <a:xfrm>
+            <a:off x="3987136" y="2056689"/>
+            <a:ext cx="8039100" cy="5934075"/>
+          </a:xfrm>
+          <a:prstGeom prst="rect">
+            <a:avLst/>
+          </a:prstGeom>
+        </p:spPr>
+      </p:pic>
+    </p:spTree>
+    <p:extLst>
+      <p:ext uri="{BB962C8B-B14F-4D97-AF65-F5344CB8AC3E}">
+        <p14:creationId xmlns:p14="http://schemas.microsoft.com/office/powerpoint/2010/main" val="586178984"/>
+      </p:ext>
+    </p:extLst>
+  </p:cSld>
+  <p:clrMapOvr>
+    <a:masterClrMapping/>
+  </p:clrMapOvr>
+</p:sld>
+</file>
+
+<file path=ppt/slides/slide11.xml><?xml version="1.0" encoding="utf-8"?>
 <p:sld xmlns:a="http://schemas.openxmlformats.org/drawingml/2006/main" xmlns:r="http://schemas.openxmlformats.org/officeDocument/2006/relationships" xmlns:p="http://schemas.openxmlformats.org/presentationml/2006/main">
   <p:cSld>
     <p:bg>
@@ -3835,68 +4005,6 @@
 </p:sld>
 </file>
 
-<file path=ppt/slides/slide11.xml><?xml version="1.0" encoding="utf-8"?>
-<p:sld xmlns:a="http://schemas.openxmlformats.org/drawingml/2006/main" xmlns:r="http://schemas.openxmlformats.org/officeDocument/2006/relationships" xmlns:p="http://schemas.openxmlformats.org/presentationml/2006/main">
-  <p:cSld>
-    <p:spTree>
-      <p:nvGrpSpPr>
-        <p:cNvPr id="1" name=""/>
-        <p:cNvGrpSpPr/>
-        <p:nvPr/>
-      </p:nvGrpSpPr>
-      <p:grpSpPr>
-        <a:xfrm>
-          <a:off x="0" y="0"/>
-          <a:ext cx="0" cy="0"/>
-          <a:chOff x="0" y="0"/>
-          <a:chExt cx="0" cy="0"/>
-        </a:xfrm>
-      </p:grpSpPr>
-      <p:sp>
-        <p:nvSpPr>
-          <p:cNvPr id="2" name="Title 1">
-            <a:extLst>
-              <a:ext uri="{FF2B5EF4-FFF2-40B4-BE49-F238E27FC236}">
-                <a16:creationId xmlns:a16="http://schemas.microsoft.com/office/drawing/2014/main" id="{B0C5AC2E-64E6-4282-9173-C53CBDF3F34C}"/>
-              </a:ext>
-            </a:extLst>
-          </p:cNvPr>
-          <p:cNvSpPr>
-            <a:spLocks noGrp="1"/>
-          </p:cNvSpPr>
-          <p:nvPr>
-            <p:ph type="title"/>
-          </p:nvPr>
-        </p:nvSpPr>
-        <p:spPr>
-          <a:xfrm>
-            <a:off x="321906" y="214296"/>
-            <a:ext cx="11870094" cy="1756283"/>
-          </a:xfrm>
-        </p:spPr>
-        <p:txBody>
-          <a:bodyPr>
-            <a:normAutofit/>
-          </a:bodyPr>
-          <a:lstStyle/>
-          <a:p>
-            <a:endParaRPr lang="en-GB" dirty="0"/>
-          </a:p>
-        </p:txBody>
-      </p:sp>
-    </p:spTree>
-    <p:extLst>
-      <p:ext uri="{BB962C8B-B14F-4D97-AF65-F5344CB8AC3E}">
-        <p14:creationId xmlns:p14="http://schemas.microsoft.com/office/powerpoint/2010/main" val="1518196486"/>
-      </p:ext>
-    </p:extLst>
-  </p:cSld>
-  <p:clrMapOvr>
-    <a:masterClrMapping/>
-  </p:clrMapOvr>
-</p:sld>
-</file>
-
 <file path=ppt/slides/slide12.xml><?xml version="1.0" encoding="utf-8"?>
 <p:sld xmlns:a="http://schemas.openxmlformats.org/drawingml/2006/main" xmlns:r="http://schemas.openxmlformats.org/officeDocument/2006/relationships" xmlns:p="http://schemas.openxmlformats.org/presentationml/2006/main">
   <p:cSld>
@@ -3942,10 +4050,333 @@
           </a:bodyPr>
           <a:lstStyle/>
           <a:p>
+            <a:r>
+              <a:rPr lang="en-GB" dirty="0" err="1">
+                <a:hlinkClick r:id="rId2"/>
+              </a:rPr>
+              <a:t>Plotly</a:t>
+            </a:r>
+            <a:r>
+              <a:rPr lang="en-GB" dirty="0">
+                <a:hlinkClick r:id="rId2"/>
+              </a:rPr>
+              <a:t> Shapes</a:t>
+            </a:r>
             <a:endParaRPr lang="en-GB" dirty="0"/>
           </a:p>
         </p:txBody>
       </p:sp>
+      <p:pic>
+        <p:nvPicPr>
+          <p:cNvPr id="3" name="Picture 2">
+            <a:extLst>
+              <a:ext uri="{FF2B5EF4-FFF2-40B4-BE49-F238E27FC236}">
+                <a16:creationId xmlns:a16="http://schemas.microsoft.com/office/drawing/2014/main" id="{20D48E1B-316E-4D98-88E3-2013CCE02DB8}"/>
+              </a:ext>
+            </a:extLst>
+          </p:cNvPr>
+          <p:cNvPicPr>
+            <a:picLocks noChangeAspect="1"/>
+          </p:cNvPicPr>
+          <p:nvPr/>
+        </p:nvPicPr>
+        <p:blipFill>
+          <a:blip r:embed="rId3"/>
+          <a:stretch>
+            <a:fillRect/>
+          </a:stretch>
+        </p:blipFill>
+        <p:spPr>
+          <a:xfrm>
+            <a:off x="321906" y="1637522"/>
+            <a:ext cx="5405436" cy="2414587"/>
+          </a:xfrm>
+          <a:prstGeom prst="rect">
+            <a:avLst/>
+          </a:prstGeom>
+        </p:spPr>
+      </p:pic>
+      <p:pic>
+        <p:nvPicPr>
+          <p:cNvPr id="4" name="Picture 3">
+            <a:extLst>
+              <a:ext uri="{FF2B5EF4-FFF2-40B4-BE49-F238E27FC236}">
+                <a16:creationId xmlns:a16="http://schemas.microsoft.com/office/drawing/2014/main" id="{1EA63B6F-1206-4847-BF9B-72616C5CCF3B}"/>
+              </a:ext>
+            </a:extLst>
+          </p:cNvPr>
+          <p:cNvPicPr>
+            <a:picLocks noChangeAspect="1"/>
+          </p:cNvPicPr>
+          <p:nvPr/>
+        </p:nvPicPr>
+        <p:blipFill>
+          <a:blip r:embed="rId4"/>
+          <a:stretch>
+            <a:fillRect/>
+          </a:stretch>
+        </p:blipFill>
+        <p:spPr>
+          <a:xfrm>
+            <a:off x="5084064" y="3014169"/>
+            <a:ext cx="6379273" cy="2615106"/>
+          </a:xfrm>
+          <a:prstGeom prst="rect">
+            <a:avLst/>
+          </a:prstGeom>
+        </p:spPr>
+      </p:pic>
+    </p:spTree>
+    <p:extLst>
+      <p:ext uri="{BB962C8B-B14F-4D97-AF65-F5344CB8AC3E}">
+        <p14:creationId xmlns:p14="http://schemas.microsoft.com/office/powerpoint/2010/main" val="1518196486"/>
+      </p:ext>
+    </p:extLst>
+  </p:cSld>
+  <p:clrMapOvr>
+    <a:masterClrMapping/>
+  </p:clrMapOvr>
+</p:sld>
+</file>
+
+<file path=ppt/slides/slide13.xml><?xml version="1.0" encoding="utf-8"?>
+<p:sld xmlns:a="http://schemas.openxmlformats.org/drawingml/2006/main" xmlns:r="http://schemas.openxmlformats.org/officeDocument/2006/relationships" xmlns:p="http://schemas.openxmlformats.org/presentationml/2006/main">
+  <p:cSld>
+    <p:bg>
+      <p:bgPr>
+        <a:solidFill>
+          <a:schemeClr val="bg1"/>
+        </a:solidFill>
+        <a:effectLst/>
+      </p:bgPr>
+    </p:bg>
+    <p:spTree>
+      <p:nvGrpSpPr>
+        <p:cNvPr id="1" name=""/>
+        <p:cNvGrpSpPr/>
+        <p:nvPr/>
+      </p:nvGrpSpPr>
+      <p:grpSpPr>
+        <a:xfrm>
+          <a:off x="0" y="0"/>
+          <a:ext cx="0" cy="0"/>
+          <a:chOff x="0" y="0"/>
+          <a:chExt cx="0" cy="0"/>
+        </a:xfrm>
+      </p:grpSpPr>
+      <p:sp>
+        <p:nvSpPr>
+          <p:cNvPr id="8" name="Rectangle 7">
+            <a:extLst>
+              <a:ext uri="{FF2B5EF4-FFF2-40B4-BE49-F238E27FC236}">
+                <a16:creationId xmlns:a16="http://schemas.microsoft.com/office/drawing/2014/main" id="{6753252F-4873-4F63-801D-CC719279A7D5}"/>
+              </a:ext>
+              <a:ext uri="{C183D7F6-B498-43B3-948B-1728B52AA6E4}">
+                <adec:decorative xmlns:adec="http://schemas.microsoft.com/office/drawing/2017/decorative" val="1"/>
+              </a:ext>
+            </a:extLst>
+          </p:cNvPr>
+          <p:cNvSpPr>
+            <a:spLocks noGrp="1" noRot="1" noChangeAspect="1" noMove="1" noResize="1" noEditPoints="1" noAdjustHandles="1" noChangeArrowheads="1" noChangeShapeType="1" noTextEdit="1"/>
+          </p:cNvSpPr>
+          <p:nvPr>
+            <p:extLst>
+              <p:ext uri="{386F3935-93C4-4BCD-93E2-E3B085C9AB24}">
+                <p16:designElem xmlns:p16="http://schemas.microsoft.com/office/powerpoint/2015/main" val="1"/>
+              </p:ext>
+            </p:extLst>
+          </p:nvPr>
+        </p:nvSpPr>
+        <p:spPr>
+          <a:xfrm>
+            <a:off x="0" y="0"/>
+            <a:ext cx="12192000" cy="6858000"/>
+          </a:xfrm>
+          <a:prstGeom prst="rect">
+            <a:avLst/>
+          </a:prstGeom>
+          <a:solidFill>
+            <a:srgbClr val="FFFFFF"/>
+          </a:solidFill>
+          <a:ln>
+            <a:noFill/>
+          </a:ln>
+        </p:spPr>
+        <p:style>
+          <a:lnRef idx="2">
+            <a:schemeClr val="accent1">
+              <a:shade val="50000"/>
+            </a:schemeClr>
+          </a:lnRef>
+          <a:fillRef idx="1">
+            <a:schemeClr val="accent1"/>
+          </a:fillRef>
+          <a:effectRef idx="0">
+            <a:schemeClr val="accent1"/>
+          </a:effectRef>
+          <a:fontRef idx="minor">
+            <a:schemeClr val="lt1"/>
+          </a:fontRef>
+        </p:style>
+        <p:txBody>
+          <a:bodyPr rtlCol="0" anchor="ctr"/>
+          <a:lstStyle/>
+          <a:p>
+            <a:pPr algn="ctr"/>
+            <a:endParaRPr lang="en-US"/>
+          </a:p>
+        </p:txBody>
+      </p:sp>
+      <p:sp>
+        <p:nvSpPr>
+          <p:cNvPr id="10" name="Rectangle 9">
+            <a:extLst>
+              <a:ext uri="{FF2B5EF4-FFF2-40B4-BE49-F238E27FC236}">
+                <a16:creationId xmlns:a16="http://schemas.microsoft.com/office/drawing/2014/main" id="{047C8CCB-F95D-4249-92DD-651249D3535A}"/>
+              </a:ext>
+              <a:ext uri="{C183D7F6-B498-43B3-948B-1728B52AA6E4}">
+                <adec:decorative xmlns:adec="http://schemas.microsoft.com/office/drawing/2017/decorative" val="1"/>
+              </a:ext>
+            </a:extLst>
+          </p:cNvPr>
+          <p:cNvSpPr>
+            <a:spLocks noGrp="1" noRot="1" noChangeAspect="1" noMove="1" noResize="1" noEditPoints="1" noAdjustHandles="1" noChangeArrowheads="1" noChangeShapeType="1" noTextEdit="1"/>
+          </p:cNvSpPr>
+          <p:nvPr>
+            <p:extLst>
+              <p:ext uri="{386F3935-93C4-4BCD-93E2-E3B085C9AB24}">
+                <p16:designElem xmlns:p16="http://schemas.microsoft.com/office/powerpoint/2015/main" val="1"/>
+              </p:ext>
+            </p:extLst>
+          </p:nvPr>
+        </p:nvSpPr>
+        <p:spPr>
+          <a:xfrm>
+            <a:off x="0" y="0"/>
+            <a:ext cx="2013557" cy="6858000"/>
+          </a:xfrm>
+          <a:prstGeom prst="rect">
+            <a:avLst/>
+          </a:prstGeom>
+          <a:solidFill>
+            <a:srgbClr val="523841"/>
+          </a:solidFill>
+          <a:ln>
+            <a:noFill/>
+          </a:ln>
+        </p:spPr>
+        <p:style>
+          <a:lnRef idx="2">
+            <a:schemeClr val="accent1">
+              <a:shade val="50000"/>
+            </a:schemeClr>
+          </a:lnRef>
+          <a:fillRef idx="1">
+            <a:schemeClr val="accent1"/>
+          </a:fillRef>
+          <a:effectRef idx="0">
+            <a:schemeClr val="accent1"/>
+          </a:effectRef>
+          <a:fontRef idx="minor">
+            <a:schemeClr val="lt1"/>
+          </a:fontRef>
+        </p:style>
+        <p:txBody>
+          <a:bodyPr rtlCol="0" anchor="ctr"/>
+          <a:lstStyle/>
+          <a:p>
+            <a:pPr algn="ctr"/>
+            <a:endParaRPr lang="en-US"/>
+          </a:p>
+        </p:txBody>
+      </p:sp>
+      <p:sp>
+        <p:nvSpPr>
+          <p:cNvPr id="2" name="Title 1">
+            <a:extLst>
+              <a:ext uri="{FF2B5EF4-FFF2-40B4-BE49-F238E27FC236}">
+                <a16:creationId xmlns:a16="http://schemas.microsoft.com/office/drawing/2014/main" id="{B0C5AC2E-64E6-4282-9173-C53CBDF3F34C}"/>
+              </a:ext>
+            </a:extLst>
+          </p:cNvPr>
+          <p:cNvSpPr>
+            <a:spLocks noGrp="1"/>
+          </p:cNvSpPr>
+          <p:nvPr>
+            <p:ph type="title"/>
+          </p:nvPr>
+        </p:nvSpPr>
+        <p:spPr>
+          <a:xfrm>
+            <a:off x="640080" y="2074363"/>
+            <a:ext cx="2752354" cy="2709275"/>
+          </a:xfrm>
+          <a:prstGeom prst="ellipse">
+            <a:avLst/>
+          </a:prstGeom>
+          <a:solidFill>
+            <a:srgbClr val="262626"/>
+          </a:solidFill>
+          <a:ln w="174625" cmpd="thinThick">
+            <a:solidFill>
+              <a:srgbClr val="262626"/>
+            </a:solidFill>
+          </a:ln>
+        </p:spPr>
+        <p:txBody>
+          <a:bodyPr anchor="ctr">
+            <a:normAutofit/>
+          </a:bodyPr>
+          <a:lstStyle/>
+          <a:p>
+            <a:pPr algn="ctr"/>
+            <a:r>
+              <a:rPr lang="en-GB" sz="2600" dirty="0">
+                <a:solidFill>
+                  <a:srgbClr val="FFFFFF"/>
+                </a:solidFill>
+                <a:hlinkClick r:id="rId2"/>
+              </a:rPr>
+              <a:t>Legends 3D objects  </a:t>
+            </a:r>
+            <a:endParaRPr lang="en-GB" sz="2600" dirty="0">
+              <a:solidFill>
+                <a:srgbClr val="FFFFFF"/>
+              </a:solidFill>
+            </a:endParaRPr>
+          </a:p>
+        </p:txBody>
+      </p:sp>
+      <p:pic>
+        <p:nvPicPr>
+          <p:cNvPr id="3" name="Picture 2">
+            <a:extLst>
+              <a:ext uri="{FF2B5EF4-FFF2-40B4-BE49-F238E27FC236}">
+                <a16:creationId xmlns:a16="http://schemas.microsoft.com/office/drawing/2014/main" id="{80A8765B-FCAE-4306-B975-7F8E406A6DCE}"/>
+              </a:ext>
+            </a:extLst>
+          </p:cNvPr>
+          <p:cNvPicPr>
+            <a:picLocks noChangeAspect="1"/>
+          </p:cNvPicPr>
+          <p:nvPr/>
+        </p:nvPicPr>
+        <p:blipFill>
+          <a:blip r:embed="rId3"/>
+          <a:stretch>
+            <a:fillRect/>
+          </a:stretch>
+        </p:blipFill>
+        <p:spPr>
+          <a:xfrm>
+            <a:off x="4038600" y="1028244"/>
+            <a:ext cx="7188199" cy="4798122"/>
+          </a:xfrm>
+          <a:prstGeom prst="rect">
+            <a:avLst/>
+          </a:prstGeom>
+        </p:spPr>
+      </p:pic>
     </p:spTree>
     <p:extLst>
       <p:ext uri="{BB962C8B-B14F-4D97-AF65-F5344CB8AC3E}">

</xml_diff>

<commit_message>
Dash dbc and multiapp
</commit_message>
<xml_diff>
--- a/Dash Features.pptx
+++ b/Dash Features.pptx
@@ -273,7 +273,7 @@
           <a:p>
             <a:fld id="{BB35A562-BE17-4BC1-84B9-F5B76653FD8E}" type="datetimeFigureOut">
               <a:rPr lang="en-GB" smtClean="0"/>
-              <a:t>10/04/2020</a:t>
+              <a:t>06/05/2020</a:t>
             </a:fld>
             <a:endParaRPr lang="en-GB"/>
           </a:p>
@@ -473,7 +473,7 @@
           <a:p>
             <a:fld id="{BB35A562-BE17-4BC1-84B9-F5B76653FD8E}" type="datetimeFigureOut">
               <a:rPr lang="en-GB" smtClean="0"/>
-              <a:t>10/04/2020</a:t>
+              <a:t>06/05/2020</a:t>
             </a:fld>
             <a:endParaRPr lang="en-GB"/>
           </a:p>
@@ -683,7 +683,7 @@
           <a:p>
             <a:fld id="{BB35A562-BE17-4BC1-84B9-F5B76653FD8E}" type="datetimeFigureOut">
               <a:rPr lang="en-GB" smtClean="0"/>
-              <a:t>10/04/2020</a:t>
+              <a:t>06/05/2020</a:t>
             </a:fld>
             <a:endParaRPr lang="en-GB"/>
           </a:p>
@@ -883,7 +883,7 @@
           <a:p>
             <a:fld id="{BB35A562-BE17-4BC1-84B9-F5B76653FD8E}" type="datetimeFigureOut">
               <a:rPr lang="en-GB" smtClean="0"/>
-              <a:t>10/04/2020</a:t>
+              <a:t>06/05/2020</a:t>
             </a:fld>
             <a:endParaRPr lang="en-GB"/>
           </a:p>
@@ -1159,7 +1159,7 @@
           <a:p>
             <a:fld id="{BB35A562-BE17-4BC1-84B9-F5B76653FD8E}" type="datetimeFigureOut">
               <a:rPr lang="en-GB" smtClean="0"/>
-              <a:t>10/04/2020</a:t>
+              <a:t>06/05/2020</a:t>
             </a:fld>
             <a:endParaRPr lang="en-GB"/>
           </a:p>
@@ -1427,7 +1427,7 @@
           <a:p>
             <a:fld id="{BB35A562-BE17-4BC1-84B9-F5B76653FD8E}" type="datetimeFigureOut">
               <a:rPr lang="en-GB" smtClean="0"/>
-              <a:t>10/04/2020</a:t>
+              <a:t>06/05/2020</a:t>
             </a:fld>
             <a:endParaRPr lang="en-GB"/>
           </a:p>
@@ -1842,7 +1842,7 @@
           <a:p>
             <a:fld id="{BB35A562-BE17-4BC1-84B9-F5B76653FD8E}" type="datetimeFigureOut">
               <a:rPr lang="en-GB" smtClean="0"/>
-              <a:t>10/04/2020</a:t>
+              <a:t>06/05/2020</a:t>
             </a:fld>
             <a:endParaRPr lang="en-GB"/>
           </a:p>
@@ -1984,7 +1984,7 @@
           <a:p>
             <a:fld id="{BB35A562-BE17-4BC1-84B9-F5B76653FD8E}" type="datetimeFigureOut">
               <a:rPr lang="en-GB" smtClean="0"/>
-              <a:t>10/04/2020</a:t>
+              <a:t>06/05/2020</a:t>
             </a:fld>
             <a:endParaRPr lang="en-GB"/>
           </a:p>
@@ -2097,7 +2097,7 @@
           <a:p>
             <a:fld id="{BB35A562-BE17-4BC1-84B9-F5B76653FD8E}" type="datetimeFigureOut">
               <a:rPr lang="en-GB" smtClean="0"/>
-              <a:t>10/04/2020</a:t>
+              <a:t>06/05/2020</a:t>
             </a:fld>
             <a:endParaRPr lang="en-GB"/>
           </a:p>
@@ -2410,7 +2410,7 @@
           <a:p>
             <a:fld id="{BB35A562-BE17-4BC1-84B9-F5B76653FD8E}" type="datetimeFigureOut">
               <a:rPr lang="en-GB" smtClean="0"/>
-              <a:t>10/04/2020</a:t>
+              <a:t>06/05/2020</a:t>
             </a:fld>
             <a:endParaRPr lang="en-GB"/>
           </a:p>
@@ -2699,7 +2699,7 @@
           <a:p>
             <a:fld id="{BB35A562-BE17-4BC1-84B9-F5B76653FD8E}" type="datetimeFigureOut">
               <a:rPr lang="en-GB" smtClean="0"/>
-              <a:t>10/04/2020</a:t>
+              <a:t>06/05/2020</a:t>
             </a:fld>
             <a:endParaRPr lang="en-GB"/>
           </a:p>
@@ -2942,7 +2942,7 @@
           <a:p>
             <a:fld id="{BB35A562-BE17-4BC1-84B9-F5B76653FD8E}" type="datetimeFigureOut">
               <a:rPr lang="en-GB" smtClean="0"/>
-              <a:t>10/04/2020</a:t>
+              <a:t>06/05/2020</a:t>
             </a:fld>
             <a:endParaRPr lang="en-GB"/>
           </a:p>

</xml_diff>